<commit_message>
through L6.6 and GP6.7
</commit_message>
<xml_diff>
--- a/Slides/Lesson 6.6 From Templates to Folds.pptx
+++ b/Slides/Lesson 6.6 From Templates to Folds.pptx
@@ -232,7 +232,7 @@
           <a:p>
             <a:fld id="{1AC50D25-69DA-4251-A3B1-10895C6A89D6}" type="datetimeFigureOut">
               <a:rPr lang="en-US" smtClean="0"/>
-              <a:t>9/16/2017</a:t>
+              <a:t>9/17/2017</a:t>
             </a:fld>
             <a:endParaRPr lang="en-US"/>
           </a:p>
@@ -1017,7 +1017,7 @@
           <a:p>
             <a:fld id="{2F1F79F5-7BEC-496A-AFC7-876E38F64D71}" type="datetime1">
               <a:rPr lang="en-US" smtClean="0"/>
-              <a:t>9/16/2017</a:t>
+              <a:t>9/17/2017</a:t>
             </a:fld>
             <a:endParaRPr lang="en-US"/>
           </a:p>
@@ -1112,7 +1112,7 @@
           <a:p>
             <a:fld id="{0A05703A-7669-4FEA-9056-25299B4D29D4}" type="datetime1">
               <a:rPr lang="en-US" smtClean="0"/>
-              <a:t>9/16/2017</a:t>
+              <a:t>9/17/2017</a:t>
             </a:fld>
             <a:endParaRPr lang="en-US"/>
           </a:p>
@@ -1387,7 +1387,7 @@
           <a:p>
             <a:fld id="{6E5077B5-BB57-49DB-88CA-226A139E5C01}" type="datetime1">
               <a:rPr lang="en-US" smtClean="0"/>
-              <a:t>9/16/2017</a:t>
+              <a:t>9/17/2017</a:t>
             </a:fld>
             <a:endParaRPr lang="en-US"/>
           </a:p>
@@ -1639,7 +1639,7 @@
           <a:p>
             <a:fld id="{C48D9447-CBD6-49A1-89FD-8512A8CF8999}" type="datetime1">
               <a:rPr lang="en-US" smtClean="0"/>
-              <a:t>9/16/2017</a:t>
+              <a:t>9/17/2017</a:t>
             </a:fld>
             <a:endParaRPr lang="en-US"/>
           </a:p>
@@ -1807,7 +1807,7 @@
           <a:p>
             <a:fld id="{A3639A2A-823D-48B7-9ACE-7FAF42870BA9}" type="datetime1">
               <a:rPr lang="en-US" smtClean="0"/>
-              <a:t>9/16/2017</a:t>
+              <a:t>9/17/2017</a:t>
             </a:fld>
             <a:endParaRPr lang="en-US"/>
           </a:p>
@@ -1985,7 +1985,7 @@
           <a:p>
             <a:fld id="{ED1B6996-82E9-463C-972C-7B56056E426C}" type="datetime1">
               <a:rPr lang="en-US" smtClean="0"/>
-              <a:t>9/16/2017</a:t>
+              <a:t>9/17/2017</a:t>
             </a:fld>
             <a:endParaRPr lang="en-US"/>
           </a:p>
@@ -2159,7 +2159,7 @@
           <a:p>
             <a:fld id="{E22ED4DA-448D-4BB1-B935-CC112220207B}" type="datetime1">
               <a:rPr lang="en-US" smtClean="0"/>
-              <a:t>9/16/2017</a:t>
+              <a:t>9/17/2017</a:t>
             </a:fld>
             <a:endParaRPr lang="en-US"/>
           </a:p>
@@ -2332,7 +2332,7 @@
           <a:p>
             <a:fld id="{E22ED4DA-448D-4BB1-B935-CC112220207B}" type="datetime1">
               <a:rPr lang="en-US" smtClean="0"/>
-              <a:t>9/16/2017</a:t>
+              <a:t>9/17/2017</a:t>
             </a:fld>
             <a:endParaRPr lang="en-US"/>
           </a:p>
@@ -2592,7 +2592,7 @@
           <a:p>
             <a:fld id="{FF5D65A6-AB94-4435-B0B7-3743215FA46C}" type="datetime1">
               <a:rPr lang="en-US" smtClean="0"/>
-              <a:t>9/16/2017</a:t>
+              <a:t>9/17/2017</a:t>
             </a:fld>
             <a:endParaRPr lang="en-US"/>
           </a:p>
@@ -2768,7 +2768,7 @@
           <a:p>
             <a:fld id="{FF5D65A6-AB94-4435-B0B7-3743215FA46C}" type="datetime1">
               <a:rPr lang="en-US" smtClean="0"/>
-              <a:t>9/16/2017</a:t>
+              <a:t>9/17/2017</a:t>
             </a:fld>
             <a:endParaRPr lang="en-US"/>
           </a:p>
@@ -3062,7 +3062,7 @@
           <a:p>
             <a:fld id="{7C193DC4-6EF0-48C9-B29C-616106A645E1}" type="datetime1">
               <a:rPr lang="en-US" smtClean="0"/>
-              <a:t>9/16/2017</a:t>
+              <a:t>9/17/2017</a:t>
             </a:fld>
             <a:endParaRPr lang="en-US"/>
           </a:p>
@@ -3347,7 +3347,7 @@
           <a:p>
             <a:fld id="{5D1846AD-9252-4647-9435-4C2AC365653A}" type="datetime1">
               <a:rPr lang="en-US" smtClean="0"/>
-              <a:t>9/16/2017</a:t>
+              <a:t>9/17/2017</a:t>
             </a:fld>
             <a:endParaRPr lang="en-US"/>
           </a:p>
@@ -3766,7 +3766,7 @@
           <a:p>
             <a:fld id="{CE56DC10-3561-4063-A6AF-C1CC7A41040A}" type="datetime1">
               <a:rPr lang="en-US" smtClean="0"/>
-              <a:t>9/16/2017</a:t>
+              <a:t>9/17/2017</a:t>
             </a:fld>
             <a:endParaRPr lang="en-US"/>
           </a:p>
@@ -3883,7 +3883,7 @@
           <a:p>
             <a:fld id="{2F7B77F5-1464-4F6B-92A8-64FC8A508293}" type="datetime1">
               <a:rPr lang="en-US" smtClean="0"/>
-              <a:t>9/16/2017</a:t>
+              <a:t>9/17/2017</a:t>
             </a:fld>
             <a:endParaRPr lang="en-US"/>
           </a:p>
@@ -4106,7 +4106,7 @@
           <a:p>
             <a:fld id="{02B3F677-983B-48DB-ADFD-63FE6CBC7FB2}" type="datetime1">
               <a:rPr lang="en-US" smtClean="0"/>
-              <a:t>9/16/2017</a:t>
+              <a:t>9/17/2017</a:t>
             </a:fld>
             <a:endParaRPr lang="en-US"/>
           </a:p>
@@ -9187,8 +9187,13 @@
           <a:p>
             <a:r>
               <a:rPr lang="en-US" dirty="0"/>
-              <a:t>Do Guided Practice 6.6</a:t>
-            </a:r>
+              <a:t>Do </a:t>
+            </a:r>
+            <a:r>
+              <a:rPr lang="en-US"/>
+              <a:t>Guided Practices 6.6 and 6.7</a:t>
+            </a:r>
+            <a:endParaRPr lang="en-US" dirty="0"/>
           </a:p>
           <a:p>
             <a:r>

</xml_diff>